<commit_message>
Prepare For Submission - rename main code - export all words and slides to PDF format
</commit_message>
<xml_diff>
--- a/Analysis Presentation/Presentation.pptx
+++ b/Analysis Presentation/Presentation.pptx
@@ -5,7 +5,7 @@
     <p:sldMasterId id="2147483659" r:id="rId1"/>
   </p:sldMasterIdLst>
   <p:notesMasterIdLst>
-    <p:notesMasterId r:id="rId17"/>
+    <p:notesMasterId r:id="rId18"/>
   </p:notesMasterIdLst>
   <p:sldIdLst>
     <p:sldId id="267" r:id="rId2"/>
@@ -23,30 +23,31 @@
     <p:sldId id="261" r:id="rId14"/>
     <p:sldId id="262" r:id="rId15"/>
     <p:sldId id="263" r:id="rId16"/>
+    <p:sldId id="272" r:id="rId17"/>
   </p:sldIdLst>
   <p:sldSz cx="9144000" cy="5143500" type="screen16x9"/>
   <p:notesSz cx="6858000" cy="9144000"/>
   <p:embeddedFontLst>
     <p:embeddedFont>
       <p:font typeface="Consolas" panose="020B0609020204030204" pitchFamily="49" charset="0"/>
-      <p:regular r:id="rId18"/>
-      <p:bold r:id="rId19"/>
-      <p:italic r:id="rId20"/>
-      <p:boldItalic r:id="rId21"/>
+      <p:regular r:id="rId19"/>
+      <p:bold r:id="rId20"/>
+      <p:italic r:id="rId21"/>
+      <p:boldItalic r:id="rId22"/>
     </p:embeddedFont>
     <p:embeddedFont>
       <p:font typeface="Lato" panose="020F0502020204030203" pitchFamily="34" charset="0"/>
-      <p:regular r:id="rId22"/>
-      <p:bold r:id="rId23"/>
-      <p:italic r:id="rId24"/>
-      <p:boldItalic r:id="rId25"/>
+      <p:regular r:id="rId23"/>
+      <p:bold r:id="rId24"/>
+      <p:italic r:id="rId25"/>
+      <p:boldItalic r:id="rId26"/>
     </p:embeddedFont>
     <p:embeddedFont>
       <p:font typeface="Raleway" pitchFamily="2" charset="0"/>
-      <p:regular r:id="rId26"/>
-      <p:bold r:id="rId27"/>
-      <p:italic r:id="rId28"/>
-      <p:boldItalic r:id="rId29"/>
+      <p:regular r:id="rId27"/>
+      <p:bold r:id="rId28"/>
+      <p:italic r:id="rId29"/>
+      <p:boldItalic r:id="rId30"/>
     </p:embeddedFont>
   </p:embeddedFontLst>
   <p:defaultTextStyle>
@@ -1482,6 +1483,133 @@
         </p:txBody>
       </p:sp>
     </p:spTree>
+  </p:cSld>
+  <p:clrMapOvr>
+    <a:masterClrMapping/>
+  </p:clrMapOvr>
+</p:notes>
+</file>
+
+<file path=ppt/notesSlides/notesSlide16.xml><?xml version="1.0" encoding="utf-8"?>
+<p:notes xmlns:a="http://schemas.openxmlformats.org/drawingml/2006/main" xmlns:r="http://schemas.openxmlformats.org/officeDocument/2006/relationships" xmlns:p="http://schemas.openxmlformats.org/presentationml/2006/main" showMasterSp="0" showMasterPhAnim="0">
+  <p:cSld>
+    <p:spTree>
+      <p:nvGrpSpPr>
+        <p:cNvPr id="1" name="Shape 82">
+          <a:extLst>
+            <a:ext uri="{FF2B5EF4-FFF2-40B4-BE49-F238E27FC236}">
+              <a16:creationId xmlns:a16="http://schemas.microsoft.com/office/drawing/2014/main" id="{CB0690FC-84FB-CBA0-E692-348D7C069647}"/>
+            </a:ext>
+          </a:extLst>
+        </p:cNvPr>
+        <p:cNvGrpSpPr/>
+        <p:nvPr/>
+      </p:nvGrpSpPr>
+      <p:grpSpPr>
+        <a:xfrm>
+          <a:off x="0" y="0"/>
+          <a:ext cx="0" cy="0"/>
+          <a:chOff x="0" y="0"/>
+          <a:chExt cx="0" cy="0"/>
+        </a:xfrm>
+      </p:grpSpPr>
+      <p:sp>
+        <p:nvSpPr>
+          <p:cNvPr id="83" name="Google Shape;83;p:notes">
+            <a:extLst>
+              <a:ext uri="{FF2B5EF4-FFF2-40B4-BE49-F238E27FC236}">
+                <a16:creationId xmlns:a16="http://schemas.microsoft.com/office/drawing/2014/main" id="{F4F9F0AE-1E9F-C266-082B-D2D9643834FA}"/>
+              </a:ext>
+            </a:extLst>
+          </p:cNvPr>
+          <p:cNvSpPr>
+            <a:spLocks noGrp="1" noRot="1" noChangeAspect="1"/>
+          </p:cNvSpPr>
+          <p:nvPr>
+            <p:ph type="sldImg" idx="2"/>
+          </p:nvPr>
+        </p:nvSpPr>
+        <p:spPr>
+          <a:xfrm>
+            <a:off x="381000" y="685800"/>
+            <a:ext cx="6096000" cy="3429000"/>
+          </a:xfrm>
+          <a:custGeom>
+            <a:avLst/>
+            <a:gdLst/>
+            <a:ahLst/>
+            <a:cxnLst/>
+            <a:rect l="l" t="t" r="r" b="b"/>
+            <a:pathLst>
+              <a:path w="120000" h="120000" extrusionOk="0">
+                <a:moveTo>
+                  <a:pt x="0" y="0"/>
+                </a:moveTo>
+                <a:lnTo>
+                  <a:pt x="120000" y="0"/>
+                </a:lnTo>
+                <a:lnTo>
+                  <a:pt x="120000" y="120000"/>
+                </a:lnTo>
+                <a:lnTo>
+                  <a:pt x="0" y="120000"/>
+                </a:lnTo>
+                <a:close/>
+              </a:path>
+            </a:pathLst>
+          </a:custGeom>
+        </p:spPr>
+      </p:sp>
+      <p:sp>
+        <p:nvSpPr>
+          <p:cNvPr id="84" name="Google Shape;84;p:notes">
+            <a:extLst>
+              <a:ext uri="{FF2B5EF4-FFF2-40B4-BE49-F238E27FC236}">
+                <a16:creationId xmlns:a16="http://schemas.microsoft.com/office/drawing/2014/main" id="{F21EF227-3864-9AA5-F65C-9F1FA90F37CA}"/>
+              </a:ext>
+            </a:extLst>
+          </p:cNvPr>
+          <p:cNvSpPr txBox="1">
+            <a:spLocks noGrp="1"/>
+          </p:cNvSpPr>
+          <p:nvPr>
+            <p:ph type="body" idx="1"/>
+          </p:nvPr>
+        </p:nvSpPr>
+        <p:spPr>
+          <a:xfrm>
+            <a:off x="685800" y="4343400"/>
+            <a:ext cx="5486400" cy="4114800"/>
+          </a:xfrm>
+          <a:prstGeom prst="rect">
+            <a:avLst/>
+          </a:prstGeom>
+        </p:spPr>
+        <p:txBody>
+          <a:bodyPr spcFirstLastPara="1" wrap="square" lIns="91425" tIns="91425" rIns="91425" bIns="91425" anchor="t" anchorCtr="0">
+            <a:noAutofit/>
+          </a:bodyPr>
+          <a:lstStyle/>
+          <a:p>
+            <a:pPr marL="0" lvl="0" indent="0" algn="l" rtl="0">
+              <a:spcBef>
+                <a:spcPts val="0"/>
+              </a:spcBef>
+              <a:spcAft>
+                <a:spcPts val="0"/>
+              </a:spcAft>
+              <a:buNone/>
+            </a:pPr>
+            <a:endParaRPr/>
+          </a:p>
+        </p:txBody>
+      </p:sp>
+    </p:spTree>
+    <p:extLst>
+      <p:ext uri="{BB962C8B-B14F-4D97-AF65-F5344CB8AC3E}">
+        <p14:creationId xmlns:p14="http://schemas.microsoft.com/office/powerpoint/2010/main" val="3553712241"/>
+      </p:ext>
+    </p:extLst>
   </p:cSld>
   <p:clrMapOvr>
     <a:masterClrMapping/>
@@ -11520,6 +11648,124 @@
 </p:sld>
 </file>
 
+<file path=ppt/slides/slide16.xml><?xml version="1.0" encoding="utf-8"?>
+<p:sld xmlns:a="http://schemas.openxmlformats.org/drawingml/2006/main" xmlns:r="http://schemas.openxmlformats.org/officeDocument/2006/relationships" xmlns:p="http://schemas.openxmlformats.org/presentationml/2006/main">
+  <p:cSld>
+    <p:spTree>
+      <p:nvGrpSpPr>
+        <p:cNvPr id="1" name="Shape 85">
+          <a:extLst>
+            <a:ext uri="{FF2B5EF4-FFF2-40B4-BE49-F238E27FC236}">
+              <a16:creationId xmlns:a16="http://schemas.microsoft.com/office/drawing/2014/main" id="{F067CBC7-5D0F-10D7-F95E-6DB5BC862902}"/>
+            </a:ext>
+          </a:extLst>
+        </p:cNvPr>
+        <p:cNvGrpSpPr/>
+        <p:nvPr/>
+      </p:nvGrpSpPr>
+      <p:grpSpPr>
+        <a:xfrm>
+          <a:off x="0" y="0"/>
+          <a:ext cx="0" cy="0"/>
+          <a:chOff x="0" y="0"/>
+          <a:chExt cx="0" cy="0"/>
+        </a:xfrm>
+      </p:grpSpPr>
+      <p:sp>
+        <p:nvSpPr>
+          <p:cNvPr id="86" name="Google Shape;86;p13">
+            <a:extLst>
+              <a:ext uri="{FF2B5EF4-FFF2-40B4-BE49-F238E27FC236}">
+                <a16:creationId xmlns:a16="http://schemas.microsoft.com/office/drawing/2014/main" id="{C938B6E5-5CAF-A5F5-B33B-CA3533159D10}"/>
+              </a:ext>
+            </a:extLst>
+          </p:cNvPr>
+          <p:cNvSpPr txBox="1">
+            <a:spLocks noGrp="1"/>
+          </p:cNvSpPr>
+          <p:nvPr>
+            <p:ph type="ctrTitle"/>
+          </p:nvPr>
+        </p:nvSpPr>
+        <p:spPr>
+          <a:xfrm>
+            <a:off x="727950" y="2139935"/>
+            <a:ext cx="7688100" cy="1664700"/>
+          </a:xfrm>
+          <a:prstGeom prst="rect">
+            <a:avLst/>
+          </a:prstGeom>
+        </p:spPr>
+        <p:txBody>
+          <a:bodyPr spcFirstLastPara="1" wrap="square" lIns="91425" tIns="91425" rIns="91425" bIns="91425" anchor="t" anchorCtr="0">
+            <a:normAutofit/>
+          </a:bodyPr>
+          <a:lstStyle/>
+          <a:p>
+            <a:pPr marL="0" lvl="0" indent="0" algn="ctr" rtl="0">
+              <a:spcBef>
+                <a:spcPts val="0"/>
+              </a:spcBef>
+              <a:spcAft>
+                <a:spcPts val="0"/>
+              </a:spcAft>
+              <a:buNone/>
+            </a:pPr>
+            <a:r>
+              <a:rPr lang="en-US" sz="6000" dirty="0">
+                <a:ln w="9525">
+                  <a:solidFill>
+                    <a:schemeClr val="bg1"/>
+                  </a:solidFill>
+                  <a:prstDash val="solid"/>
+                </a:ln>
+                <a:solidFill>
+                  <a:schemeClr val="tx1"/>
+                </a:solidFill>
+                <a:effectLst>
+                  <a:outerShdw blurRad="12700" dist="38100" dir="2700000" algn="tl" rotWithShape="0">
+                    <a:schemeClr val="bg1">
+                      <a:lumMod val="50000"/>
+                    </a:schemeClr>
+                  </a:outerShdw>
+                </a:effectLst>
+              </a:rPr>
+              <a:t>Thank You!</a:t>
+            </a:r>
+            <a:endParaRPr sz="6000" dirty="0">
+              <a:ln w="9525">
+                <a:solidFill>
+                  <a:schemeClr val="bg1"/>
+                </a:solidFill>
+                <a:prstDash val="solid"/>
+              </a:ln>
+              <a:solidFill>
+                <a:schemeClr val="tx1"/>
+              </a:solidFill>
+              <a:effectLst>
+                <a:outerShdw blurRad="12700" dist="38100" dir="2700000" algn="tl" rotWithShape="0">
+                  <a:schemeClr val="bg1">
+                    <a:lumMod val="50000"/>
+                  </a:schemeClr>
+                </a:outerShdw>
+              </a:effectLst>
+            </a:endParaRPr>
+          </a:p>
+        </p:txBody>
+      </p:sp>
+    </p:spTree>
+    <p:extLst>
+      <p:ext uri="{BB962C8B-B14F-4D97-AF65-F5344CB8AC3E}">
+        <p14:creationId xmlns:p14="http://schemas.microsoft.com/office/powerpoint/2010/main" val="3215676768"/>
+      </p:ext>
+    </p:extLst>
+  </p:cSld>
+  <p:clrMapOvr>
+    <a:masterClrMapping/>
+  </p:clrMapOvr>
+</p:sld>
+</file>
+
 <file path=ppt/slides/slide2.xml><?xml version="1.0" encoding="utf-8"?>
 <p:sld xmlns:a="http://schemas.openxmlformats.org/drawingml/2006/main" xmlns:r="http://schemas.openxmlformats.org/officeDocument/2006/relationships" xmlns:p="http://schemas.openxmlformats.org/presentationml/2006/main">
   <p:cSld>

</xml_diff>